<commit_message>
Editing: Refined notations and diagram
</commit_message>
<xml_diff>
--- a/thesis-paper/Figures/diagrams.pptx
+++ b/thesis-paper/Figures/diagrams.pptx
@@ -198,7 +198,7 @@
           <a:p>
             <a:fld id="{86F821BD-8487-424C-BBE1-C33FA9EE49D2}" type="datetimeFigureOut">
               <a:rPr lang="en-AU" smtClean="0"/>
-              <a:t>14/09/2015</a:t>
+              <a:t>15/09/2015</a:t>
             </a:fld>
             <a:endParaRPr lang="en-AU"/>
           </a:p>
@@ -686,7 +686,7 @@
           <a:p>
             <a:fld id="{CBEC48C1-88EF-40BB-A6F8-168F32703100}" type="datetimeFigureOut">
               <a:rPr lang="en-AU" smtClean="0"/>
-              <a:t>14/09/2015</a:t>
+              <a:t>15/09/2015</a:t>
             </a:fld>
             <a:endParaRPr lang="en-AU"/>
           </a:p>
@@ -856,7 +856,7 @@
           <a:p>
             <a:fld id="{CBEC48C1-88EF-40BB-A6F8-168F32703100}" type="datetimeFigureOut">
               <a:rPr lang="en-AU" smtClean="0"/>
-              <a:t>14/09/2015</a:t>
+              <a:t>15/09/2015</a:t>
             </a:fld>
             <a:endParaRPr lang="en-AU"/>
           </a:p>
@@ -1036,7 +1036,7 @@
           <a:p>
             <a:fld id="{CBEC48C1-88EF-40BB-A6F8-168F32703100}" type="datetimeFigureOut">
               <a:rPr lang="en-AU" smtClean="0"/>
-              <a:t>14/09/2015</a:t>
+              <a:t>15/09/2015</a:t>
             </a:fld>
             <a:endParaRPr lang="en-AU"/>
           </a:p>
@@ -1206,7 +1206,7 @@
           <a:p>
             <a:fld id="{CBEC48C1-88EF-40BB-A6F8-168F32703100}" type="datetimeFigureOut">
               <a:rPr lang="en-AU" smtClean="0"/>
-              <a:t>14/09/2015</a:t>
+              <a:t>15/09/2015</a:t>
             </a:fld>
             <a:endParaRPr lang="en-AU"/>
           </a:p>
@@ -1450,7 +1450,7 @@
           <a:p>
             <a:fld id="{CBEC48C1-88EF-40BB-A6F8-168F32703100}" type="datetimeFigureOut">
               <a:rPr lang="en-AU" smtClean="0"/>
-              <a:t>14/09/2015</a:t>
+              <a:t>15/09/2015</a:t>
             </a:fld>
             <a:endParaRPr lang="en-AU"/>
           </a:p>
@@ -1682,7 +1682,7 @@
           <a:p>
             <a:fld id="{CBEC48C1-88EF-40BB-A6F8-168F32703100}" type="datetimeFigureOut">
               <a:rPr lang="en-AU" smtClean="0"/>
-              <a:t>14/09/2015</a:t>
+              <a:t>15/09/2015</a:t>
             </a:fld>
             <a:endParaRPr lang="en-AU"/>
           </a:p>
@@ -2049,7 +2049,7 @@
           <a:p>
             <a:fld id="{CBEC48C1-88EF-40BB-A6F8-168F32703100}" type="datetimeFigureOut">
               <a:rPr lang="en-AU" smtClean="0"/>
-              <a:t>14/09/2015</a:t>
+              <a:t>15/09/2015</a:t>
             </a:fld>
             <a:endParaRPr lang="en-AU"/>
           </a:p>
@@ -2167,7 +2167,7 @@
           <a:p>
             <a:fld id="{CBEC48C1-88EF-40BB-A6F8-168F32703100}" type="datetimeFigureOut">
               <a:rPr lang="en-AU" smtClean="0"/>
-              <a:t>14/09/2015</a:t>
+              <a:t>15/09/2015</a:t>
             </a:fld>
             <a:endParaRPr lang="en-AU"/>
           </a:p>
@@ -2262,7 +2262,7 @@
           <a:p>
             <a:fld id="{CBEC48C1-88EF-40BB-A6F8-168F32703100}" type="datetimeFigureOut">
               <a:rPr lang="en-AU" smtClean="0"/>
-              <a:t>14/09/2015</a:t>
+              <a:t>15/09/2015</a:t>
             </a:fld>
             <a:endParaRPr lang="en-AU"/>
           </a:p>
@@ -2539,7 +2539,7 @@
           <a:p>
             <a:fld id="{CBEC48C1-88EF-40BB-A6F8-168F32703100}" type="datetimeFigureOut">
               <a:rPr lang="en-AU" smtClean="0"/>
-              <a:t>14/09/2015</a:t>
+              <a:t>15/09/2015</a:t>
             </a:fld>
             <a:endParaRPr lang="en-AU"/>
           </a:p>
@@ -2796,7 +2796,7 @@
           <a:p>
             <a:fld id="{CBEC48C1-88EF-40BB-A6F8-168F32703100}" type="datetimeFigureOut">
               <a:rPr lang="en-AU" smtClean="0"/>
-              <a:t>14/09/2015</a:t>
+              <a:t>15/09/2015</a:t>
             </a:fld>
             <a:endParaRPr lang="en-AU"/>
           </a:p>
@@ -3009,7 +3009,7 @@
           <a:p>
             <a:fld id="{CBEC48C1-88EF-40BB-A6F8-168F32703100}" type="datetimeFigureOut">
               <a:rPr lang="en-AU" smtClean="0"/>
-              <a:t>14/09/2015</a:t>
+              <a:t>15/09/2015</a:t>
             </a:fld>
             <a:endParaRPr lang="en-AU"/>
           </a:p>
@@ -4809,13 +4809,47 @@
               </a:path>
             </a:pathLst>
           </a:custGeom>
+          <a:gradFill>
+            <a:gsLst>
+              <a:gs pos="0">
+                <a:schemeClr val="accent1">
+                  <a:lumMod val="5000"/>
+                  <a:lumOff val="95000"/>
+                </a:schemeClr>
+              </a:gs>
+              <a:gs pos="74000">
+                <a:schemeClr val="accent1">
+                  <a:lumMod val="45000"/>
+                  <a:lumOff val="55000"/>
+                </a:schemeClr>
+              </a:gs>
+              <a:gs pos="83000">
+                <a:schemeClr val="accent1">
+                  <a:lumMod val="45000"/>
+                  <a:lumOff val="55000"/>
+                </a:schemeClr>
+              </a:gs>
+              <a:gs pos="100000">
+                <a:schemeClr val="accent1">
+                  <a:lumMod val="30000"/>
+                  <a:lumOff val="70000"/>
+                </a:schemeClr>
+              </a:gs>
+            </a:gsLst>
+            <a:lin ang="5400000" scaled="1"/>
+          </a:gradFill>
+          <a:ln>
+            <a:solidFill>
+              <a:srgbClr val="00B0F0"/>
+            </a:solidFill>
+          </a:ln>
         </p:spPr>
         <p:style>
           <a:lnRef idx="2">
             <a:schemeClr val="accent2"/>
           </a:lnRef>
-          <a:fillRef idx="1">
-            <a:schemeClr val="lt1"/>
+          <a:fillRef idx="1003">
+            <a:schemeClr val="lt2"/>
           </a:fillRef>
           <a:effectRef idx="0">
             <a:schemeClr val="accent2"/>
@@ -5693,7 +5727,12 @@
           <a:prstGeom prst="roundRect">
             <a:avLst/>
           </a:prstGeom>
-          <a:ln w="28575"/>
+          <a:ln w="28575">
+            <a:solidFill>
+              <a:srgbClr val="00B050"/>
+            </a:solidFill>
+            <a:prstDash val="sysDot"/>
+          </a:ln>
           <a:effectLst>
             <a:glow rad="228600">
               <a:schemeClr val="accent6">
@@ -5903,7 +5942,12 @@
           <a:prstGeom prst="roundRect">
             <a:avLst/>
           </a:prstGeom>
-          <a:ln w="28575"/>
+          <a:ln w="28575">
+            <a:solidFill>
+              <a:srgbClr val="00B050"/>
+            </a:solidFill>
+            <a:prstDash val="sysDot"/>
+          </a:ln>
           <a:effectLst>
             <a:glow rad="228600">
               <a:schemeClr val="accent6">
@@ -7295,8 +7339,8 @@
           </a:p>
         </p:txBody>
       </p:sp>
-      <mc:AlternateContent xmlns:mc="http://schemas.openxmlformats.org/markup-compatibility/2006">
-        <mc:Choice xmlns:a14="http://schemas.microsoft.com/office/drawing/2010/main" Requires="a14">
+      <mc:AlternateContent xmlns:mc="http://schemas.openxmlformats.org/markup-compatibility/2006" xmlns:a14="http://schemas.microsoft.com/office/drawing/2010/main">
+        <mc:Choice Requires="a14">
           <p:sp>
             <p:nvSpPr>
               <p:cNvPr id="73" name="TextBox 72"/>
@@ -7397,7 +7441,7 @@
             </p:txBody>
           </p:sp>
         </mc:Choice>
-        <mc:Fallback>
+        <mc:Fallback xmlns="">
           <p:sp>
             <p:nvSpPr>
               <p:cNvPr id="73" name="TextBox 72"/>
@@ -7498,8 +7542,8 @@
           </a:p>
         </p:txBody>
       </p:sp>
-      <mc:AlternateContent xmlns:mc="http://schemas.openxmlformats.org/markup-compatibility/2006">
-        <mc:Choice xmlns:a14="http://schemas.microsoft.com/office/drawing/2010/main" Requires="a14">
+      <mc:AlternateContent xmlns:mc="http://schemas.openxmlformats.org/markup-compatibility/2006" xmlns:a14="http://schemas.microsoft.com/office/drawing/2010/main">
+        <mc:Choice Requires="a14">
           <p:sp>
             <p:nvSpPr>
               <p:cNvPr id="75" name="TextBox 74"/>
@@ -7600,7 +7644,7 @@
             </p:txBody>
           </p:sp>
         </mc:Choice>
-        <mc:Fallback>
+        <mc:Fallback xmlns="">
           <p:sp>
             <p:nvSpPr>
               <p:cNvPr id="75" name="TextBox 74"/>
@@ -8013,8 +8057,8 @@
           </a:p>
         </p:txBody>
       </p:sp>
-      <mc:AlternateContent xmlns:mc="http://schemas.openxmlformats.org/markup-compatibility/2006">
-        <mc:Choice xmlns:a14="http://schemas.microsoft.com/office/drawing/2010/main" Requires="a14">
+      <mc:AlternateContent xmlns:mc="http://schemas.openxmlformats.org/markup-compatibility/2006" xmlns:a14="http://schemas.microsoft.com/office/drawing/2010/main">
+        <mc:Choice Requires="a14">
           <p:sp>
             <p:nvSpPr>
               <p:cNvPr id="79" name="TextBox 78"/>
@@ -8201,7 +8245,7 @@
             </p:txBody>
           </p:sp>
         </mc:Choice>
-        <mc:Fallback>
+        <mc:Fallback xmlns="">
           <p:sp>
             <p:nvSpPr>
               <p:cNvPr id="79" name="TextBox 78"/>
@@ -8302,8 +8346,8 @@
           </a:p>
         </p:txBody>
       </p:sp>
-      <mc:AlternateContent xmlns:mc="http://schemas.openxmlformats.org/markup-compatibility/2006">
-        <mc:Choice xmlns:a14="http://schemas.microsoft.com/office/drawing/2010/main" Requires="a14">
+      <mc:AlternateContent xmlns:mc="http://schemas.openxmlformats.org/markup-compatibility/2006" xmlns:a14="http://schemas.microsoft.com/office/drawing/2010/main">
+        <mc:Choice Requires="a14">
           <p:sp>
             <p:nvSpPr>
               <p:cNvPr id="81" name="TextBox 80"/>
@@ -8417,7 +8461,7 @@
             </p:txBody>
           </p:sp>
         </mc:Choice>
-        <mc:Fallback>
+        <mc:Fallback xmlns="">
           <p:sp>
             <p:nvSpPr>
               <p:cNvPr id="81" name="TextBox 80"/>
@@ -9032,7 +9076,12 @@
           <a:prstGeom prst="roundRect">
             <a:avLst/>
           </a:prstGeom>
-          <a:ln w="28575"/>
+          <a:ln w="28575">
+            <a:solidFill>
+              <a:srgbClr val="00B050"/>
+            </a:solidFill>
+            <a:prstDash val="sysDot"/>
+          </a:ln>
           <a:effectLst>
             <a:glow rad="228600">
               <a:schemeClr val="accent6">
@@ -9442,8 +9491,8 @@
           </a:p>
         </p:txBody>
       </p:sp>
-      <mc:AlternateContent xmlns:mc="http://schemas.openxmlformats.org/markup-compatibility/2006">
-        <mc:Choice xmlns:a14="http://schemas.microsoft.com/office/drawing/2010/main" Requires="a14">
+      <mc:AlternateContent xmlns:mc="http://schemas.openxmlformats.org/markup-compatibility/2006" xmlns:a14="http://schemas.microsoft.com/office/drawing/2010/main">
+        <mc:Choice Requires="a14">
           <p:sp>
             <p:nvSpPr>
               <p:cNvPr id="93" name="TextBox 92"/>
@@ -9653,7 +9702,7 @@
             </p:txBody>
           </p:sp>
         </mc:Choice>
-        <mc:Fallback>
+        <mc:Fallback xmlns="">
           <p:sp>
             <p:nvSpPr>
               <p:cNvPr id="93" name="TextBox 92"/>
@@ -9754,8 +9803,8 @@
           </a:p>
         </p:txBody>
       </p:sp>
-      <mc:AlternateContent xmlns:mc="http://schemas.openxmlformats.org/markup-compatibility/2006">
-        <mc:Choice xmlns:a14="http://schemas.microsoft.com/office/drawing/2010/main" Requires="a14">
+      <mc:AlternateContent xmlns:mc="http://schemas.openxmlformats.org/markup-compatibility/2006" xmlns:a14="http://schemas.microsoft.com/office/drawing/2010/main">
+        <mc:Choice Requires="a14">
           <p:sp>
             <p:nvSpPr>
               <p:cNvPr id="95" name="TextBox 94"/>
@@ -9965,7 +10014,7 @@
             </p:txBody>
           </p:sp>
         </mc:Choice>
-        <mc:Fallback>
+        <mc:Fallback xmlns="">
           <p:sp>
             <p:nvSpPr>
               <p:cNvPr id="95" name="TextBox 94"/>
@@ -10096,8 +10145,8 @@
         </p:nvCxnSpPr>
         <p:spPr>
           <a:xfrm flipH="1">
-            <a:off x="4314200" y="1225487"/>
-            <a:ext cx="231970" cy="2816"/>
+            <a:off x="4314200" y="1217270"/>
+            <a:ext cx="218166" cy="11033"/>
           </a:xfrm>
           <a:prstGeom prst="straightConnector1">
             <a:avLst/>
@@ -10132,8 +10181,8 @@
         </p:nvCxnSpPr>
         <p:spPr>
           <a:xfrm flipH="1" flipV="1">
-            <a:off x="2857997" y="1225487"/>
-            <a:ext cx="250290" cy="2816"/>
+            <a:off x="2845400" y="1215529"/>
+            <a:ext cx="262887" cy="12774"/>
           </a:xfrm>
           <a:prstGeom prst="straightConnector1">
             <a:avLst/>
@@ -11117,7 +11166,7 @@
         </p:nvSpPr>
         <p:spPr>
           <a:xfrm>
-            <a:off x="1149339" y="996963"/>
+            <a:off x="1136742" y="987005"/>
             <a:ext cx="1708658" cy="457048"/>
           </a:xfrm>
           <a:prstGeom prst="rect">
@@ -11151,7 +11200,7 @@
         </p:nvSpPr>
         <p:spPr>
           <a:xfrm>
-            <a:off x="4546170" y="996963"/>
+            <a:off x="4532366" y="988746"/>
             <a:ext cx="1708658" cy="457048"/>
           </a:xfrm>
           <a:prstGeom prst="rect">

</xml_diff>

<commit_message>
Editing: Working on result section. Modified names in scott reef code to reflect new nomenclature.
</commit_message>
<xml_diff>
--- a/thesis-paper/Figures/diagrams.pptx
+++ b/thesis-paper/Figures/diagrams.pptx
@@ -198,7 +198,7 @@
           <a:p>
             <a:fld id="{86F821BD-8487-424C-BBE1-C33FA9EE49D2}" type="datetimeFigureOut">
               <a:rPr lang="en-AU" smtClean="0"/>
-              <a:t>15/09/2015</a:t>
+              <a:t>20/09/2015</a:t>
             </a:fld>
             <a:endParaRPr lang="en-AU"/>
           </a:p>
@@ -686,7 +686,7 @@
           <a:p>
             <a:fld id="{CBEC48C1-88EF-40BB-A6F8-168F32703100}" type="datetimeFigureOut">
               <a:rPr lang="en-AU" smtClean="0"/>
-              <a:t>15/09/2015</a:t>
+              <a:t>20/09/2015</a:t>
             </a:fld>
             <a:endParaRPr lang="en-AU"/>
           </a:p>
@@ -856,7 +856,7 @@
           <a:p>
             <a:fld id="{CBEC48C1-88EF-40BB-A6F8-168F32703100}" type="datetimeFigureOut">
               <a:rPr lang="en-AU" smtClean="0"/>
-              <a:t>15/09/2015</a:t>
+              <a:t>20/09/2015</a:t>
             </a:fld>
             <a:endParaRPr lang="en-AU"/>
           </a:p>
@@ -1036,7 +1036,7 @@
           <a:p>
             <a:fld id="{CBEC48C1-88EF-40BB-A6F8-168F32703100}" type="datetimeFigureOut">
               <a:rPr lang="en-AU" smtClean="0"/>
-              <a:t>15/09/2015</a:t>
+              <a:t>20/09/2015</a:t>
             </a:fld>
             <a:endParaRPr lang="en-AU"/>
           </a:p>
@@ -1206,7 +1206,7 @@
           <a:p>
             <a:fld id="{CBEC48C1-88EF-40BB-A6F8-168F32703100}" type="datetimeFigureOut">
               <a:rPr lang="en-AU" smtClean="0"/>
-              <a:t>15/09/2015</a:t>
+              <a:t>20/09/2015</a:t>
             </a:fld>
             <a:endParaRPr lang="en-AU"/>
           </a:p>
@@ -1450,7 +1450,7 @@
           <a:p>
             <a:fld id="{CBEC48C1-88EF-40BB-A6F8-168F32703100}" type="datetimeFigureOut">
               <a:rPr lang="en-AU" smtClean="0"/>
-              <a:t>15/09/2015</a:t>
+              <a:t>20/09/2015</a:t>
             </a:fld>
             <a:endParaRPr lang="en-AU"/>
           </a:p>
@@ -1682,7 +1682,7 @@
           <a:p>
             <a:fld id="{CBEC48C1-88EF-40BB-A6F8-168F32703100}" type="datetimeFigureOut">
               <a:rPr lang="en-AU" smtClean="0"/>
-              <a:t>15/09/2015</a:t>
+              <a:t>20/09/2015</a:t>
             </a:fld>
             <a:endParaRPr lang="en-AU"/>
           </a:p>
@@ -2049,7 +2049,7 @@
           <a:p>
             <a:fld id="{CBEC48C1-88EF-40BB-A6F8-168F32703100}" type="datetimeFigureOut">
               <a:rPr lang="en-AU" smtClean="0"/>
-              <a:t>15/09/2015</a:t>
+              <a:t>20/09/2015</a:t>
             </a:fld>
             <a:endParaRPr lang="en-AU"/>
           </a:p>
@@ -2167,7 +2167,7 @@
           <a:p>
             <a:fld id="{CBEC48C1-88EF-40BB-A6F8-168F32703100}" type="datetimeFigureOut">
               <a:rPr lang="en-AU" smtClean="0"/>
-              <a:t>15/09/2015</a:t>
+              <a:t>20/09/2015</a:t>
             </a:fld>
             <a:endParaRPr lang="en-AU"/>
           </a:p>
@@ -2262,7 +2262,7 @@
           <a:p>
             <a:fld id="{CBEC48C1-88EF-40BB-A6F8-168F32703100}" type="datetimeFigureOut">
               <a:rPr lang="en-AU" smtClean="0"/>
-              <a:t>15/09/2015</a:t>
+              <a:t>20/09/2015</a:t>
             </a:fld>
             <a:endParaRPr lang="en-AU"/>
           </a:p>
@@ -2539,7 +2539,7 @@
           <a:p>
             <a:fld id="{CBEC48C1-88EF-40BB-A6F8-168F32703100}" type="datetimeFigureOut">
               <a:rPr lang="en-AU" smtClean="0"/>
-              <a:t>15/09/2015</a:t>
+              <a:t>20/09/2015</a:t>
             </a:fld>
             <a:endParaRPr lang="en-AU"/>
           </a:p>
@@ -2796,7 +2796,7 @@
           <a:p>
             <a:fld id="{CBEC48C1-88EF-40BB-A6F8-168F32703100}" type="datetimeFigureOut">
               <a:rPr lang="en-AU" smtClean="0"/>
-              <a:t>15/09/2015</a:t>
+              <a:t>20/09/2015</a:t>
             </a:fld>
             <a:endParaRPr lang="en-AU"/>
           </a:p>
@@ -3009,7 +3009,7 @@
           <a:p>
             <a:fld id="{CBEC48C1-88EF-40BB-A6F8-168F32703100}" type="datetimeFigureOut">
               <a:rPr lang="en-AU" smtClean="0"/>
-              <a:t>15/09/2015</a:t>
+              <a:t>20/09/2015</a:t>
             </a:fld>
             <a:endParaRPr lang="en-AU"/>
           </a:p>
@@ -5218,7 +5218,7 @@
         </p:nvSpPr>
         <p:spPr>
           <a:xfrm>
-            <a:off x="6594603" y="320828"/>
+            <a:off x="6795346" y="320828"/>
             <a:ext cx="1568871" cy="265046"/>
           </a:xfrm>
           <a:prstGeom prst="roundRect">
@@ -5263,8 +5263,8 @@
           </a:p>
         </p:txBody>
       </p:sp>
-      <mc:AlternateContent xmlns:mc="http://schemas.openxmlformats.org/markup-compatibility/2006" xmlns:a14="http://schemas.microsoft.com/office/drawing/2010/main">
-        <mc:Choice Requires="a14">
+      <mc:AlternateContent xmlns:mc="http://schemas.openxmlformats.org/markup-compatibility/2006">
+        <mc:Choice xmlns:a14="http://schemas.microsoft.com/office/drawing/2010/main" Requires="a14">
           <p:sp>
             <p:nvSpPr>
               <p:cNvPr id="11" name="TextBox 10"/>
@@ -5273,7 +5273,7 @@
             </p:nvSpPr>
             <p:spPr>
               <a:xfrm>
-                <a:off x="6594603" y="320829"/>
+                <a:off x="6795346" y="320829"/>
                 <a:ext cx="1568871" cy="300852"/>
               </a:xfrm>
               <a:prstGeom prst="rect">
@@ -5320,7 +5320,7 @@
             </p:txBody>
           </p:sp>
         </mc:Choice>
-        <mc:Fallback xmlns="">
+        <mc:Fallback>
           <p:sp>
             <p:nvSpPr>
               <p:cNvPr id="11" name="TextBox 10"/>
@@ -5331,7 +5331,7 @@
             </p:nvSpPr>
             <p:spPr>
               <a:xfrm>
-                <a:off x="6594603" y="320829"/>
+                <a:off x="6795346" y="320829"/>
                 <a:ext cx="1568871" cy="300852"/>
               </a:xfrm>
               <a:prstGeom prst="rect">
@@ -6002,10 +6002,9 @@
           <a:ln w="28575"/>
           <a:effectLst>
             <a:glow rad="228600">
-              <a:schemeClr val="accent1">
-                <a:satMod val="175000"/>
+              <a:srgbClr val="9966FF">
                 <a:alpha val="40000"/>
-              </a:schemeClr>
+              </a:srgbClr>
             </a:glow>
             <a:softEdge rad="0"/>
           </a:effectLst>
@@ -6098,9 +6097,10 @@
           <a:ln w="28575"/>
           <a:effectLst>
             <a:glow rad="228600">
-              <a:srgbClr val="7030A0">
+              <a:schemeClr val="accent1">
+                <a:satMod val="175000"/>
                 <a:alpha val="40000"/>
-              </a:srgbClr>
+              </a:schemeClr>
             </a:glow>
           </a:effectLst>
         </p:spPr>
@@ -6132,8 +6132,8 @@
           </a:p>
         </p:txBody>
       </p:sp>
-      <mc:AlternateContent xmlns:mc="http://schemas.openxmlformats.org/markup-compatibility/2006" xmlns:a14="http://schemas.microsoft.com/office/drawing/2010/main">
-        <mc:Choice Requires="a14">
+      <mc:AlternateContent xmlns:mc="http://schemas.openxmlformats.org/markup-compatibility/2006">
+        <mc:Choice xmlns:a14="http://schemas.microsoft.com/office/drawing/2010/main" Requires="a14">
           <p:sp>
             <p:nvSpPr>
               <p:cNvPr id="55" name="TextBox 54"/>
@@ -6142,7 +6142,7 @@
             </p:nvSpPr>
             <p:spPr>
               <a:xfrm>
-                <a:off x="4934676" y="2995829"/>
+                <a:off x="4934675" y="2994220"/>
                 <a:ext cx="1567115" cy="300852"/>
               </a:xfrm>
               <a:prstGeom prst="rect">
@@ -6180,7 +6180,7 @@
             </p:txBody>
           </p:sp>
         </mc:Choice>
-        <mc:Fallback xmlns="">
+        <mc:Fallback>
           <p:sp>
             <p:nvSpPr>
               <p:cNvPr id="55" name="TextBox 54"/>
@@ -6191,7 +6191,7 @@
             </p:nvSpPr>
             <p:spPr>
               <a:xfrm>
-                <a:off x="4934676" y="2995829"/>
+                <a:off x="4934675" y="2994220"/>
                 <a:ext cx="1567115" cy="300852"/>
               </a:xfrm>
               <a:prstGeom prst="rect">
@@ -6236,9 +6236,10 @@
           <a:ln w="28575"/>
           <a:effectLst>
             <a:glow rad="228600">
-              <a:srgbClr val="7030A0">
+              <a:schemeClr val="accent1">
+                <a:satMod val="175000"/>
                 <a:alpha val="40000"/>
-              </a:srgbClr>
+              </a:schemeClr>
             </a:glow>
           </a:effectLst>
         </p:spPr>
@@ -6270,8 +6271,8 @@
           </a:p>
         </p:txBody>
       </p:sp>
-      <mc:AlternateContent xmlns:mc="http://schemas.openxmlformats.org/markup-compatibility/2006" xmlns:a14="http://schemas.microsoft.com/office/drawing/2010/main">
-        <mc:Choice Requires="a14">
+      <mc:AlternateContent xmlns:mc="http://schemas.openxmlformats.org/markup-compatibility/2006">
+        <mc:Choice xmlns:a14="http://schemas.microsoft.com/office/drawing/2010/main" Requires="a14">
           <p:sp>
             <p:nvSpPr>
               <p:cNvPr id="58" name="TextBox 57"/>
@@ -6280,7 +6281,7 @@
             </p:nvSpPr>
             <p:spPr>
               <a:xfrm>
-                <a:off x="4923919" y="3412023"/>
+                <a:off x="4934669" y="3399808"/>
                 <a:ext cx="2033878" cy="300852"/>
               </a:xfrm>
               <a:prstGeom prst="rect">
@@ -6317,7 +6318,7 @@
             </p:txBody>
           </p:sp>
         </mc:Choice>
-        <mc:Fallback xmlns="">
+        <mc:Fallback>
           <p:sp>
             <p:nvSpPr>
               <p:cNvPr id="58" name="TextBox 57"/>
@@ -6328,7 +6329,7 @@
             </p:nvSpPr>
             <p:spPr>
               <a:xfrm>
-                <a:off x="4923919" y="3412023"/>
+                <a:off x="4934669" y="3399808"/>
                 <a:ext cx="2033878" cy="300852"/>
               </a:xfrm>
               <a:prstGeom prst="rect">
@@ -6337,7 +6338,7 @@
               <a:blipFill rotWithShape="0">
                 <a:blip r:embed="rId10"/>
                 <a:stretch>
-                  <a:fillRect l="-300" b="-12245"/>
+                  <a:fillRect b="-12245"/>
                 </a:stretch>
               </a:blipFill>
             </p:spPr>
@@ -6373,9 +6374,10 @@
           <a:ln w="28575"/>
           <a:effectLst>
             <a:glow rad="228600">
-              <a:srgbClr val="7030A0">
+              <a:schemeClr val="accent1">
+                <a:satMod val="175000"/>
                 <a:alpha val="40000"/>
-              </a:srgbClr>
+              </a:schemeClr>
             </a:glow>
           </a:effectLst>
         </p:spPr>
@@ -6407,8 +6409,8 @@
           </a:p>
         </p:txBody>
       </p:sp>
-      <mc:AlternateContent xmlns:mc="http://schemas.openxmlformats.org/markup-compatibility/2006" xmlns:a14="http://schemas.microsoft.com/office/drawing/2010/main">
-        <mc:Choice Requires="a14">
+      <mc:AlternateContent xmlns:mc="http://schemas.openxmlformats.org/markup-compatibility/2006">
+        <mc:Choice xmlns:a14="http://schemas.microsoft.com/office/drawing/2010/main" Requires="a14">
           <p:sp>
             <p:nvSpPr>
               <p:cNvPr id="61" name="TextBox 60"/>
@@ -6417,7 +6419,7 @@
             </p:nvSpPr>
             <p:spPr>
               <a:xfrm>
-                <a:off x="4934676" y="4293741"/>
+                <a:off x="4934676" y="4280410"/>
                 <a:ext cx="3105105" cy="417358"/>
               </a:xfrm>
               <a:prstGeom prst="rect">
@@ -6596,7 +6598,7 @@
             </p:txBody>
           </p:sp>
         </mc:Choice>
-        <mc:Fallback xmlns="">
+        <mc:Fallback>
           <p:sp>
             <p:nvSpPr>
               <p:cNvPr id="61" name="TextBox 60"/>
@@ -6607,7 +6609,7 @@
             </p:nvSpPr>
             <p:spPr>
               <a:xfrm>
-                <a:off x="4934676" y="4293741"/>
+                <a:off x="4934676" y="4280410"/>
                 <a:ext cx="3105105" cy="417358"/>
               </a:xfrm>
               <a:prstGeom prst="rect">
@@ -6652,10 +6654,9 @@
           <a:ln w="28575"/>
           <a:effectLst>
             <a:glow rad="228600">
-              <a:schemeClr val="accent1">
-                <a:satMod val="175000"/>
+              <a:srgbClr val="9966FF">
                 <a:alpha val="40000"/>
-              </a:schemeClr>
+              </a:srgbClr>
             </a:glow>
             <a:softEdge rad="0"/>
           </a:effectLst>
@@ -6740,7 +6741,7 @@
         <p:spPr>
           <a:xfrm>
             <a:off x="1433908" y="3172965"/>
-            <a:ext cx="1469875" cy="294932"/>
+            <a:ext cx="1578447" cy="294932"/>
           </a:xfrm>
           <a:prstGeom prst="roundRect">
             <a:avLst/>
@@ -6748,9 +6749,10 @@
           <a:ln w="28575"/>
           <a:effectLst>
             <a:glow rad="228600">
-              <a:srgbClr val="7030A0">
+              <a:schemeClr val="accent1">
+                <a:satMod val="175000"/>
                 <a:alpha val="40000"/>
-              </a:srgbClr>
+              </a:schemeClr>
             </a:glow>
           </a:effectLst>
         </p:spPr>
@@ -6782,8 +6784,8 @@
           </a:p>
         </p:txBody>
       </p:sp>
-      <mc:AlternateContent xmlns:mc="http://schemas.openxmlformats.org/markup-compatibility/2006" xmlns:a14="http://schemas.microsoft.com/office/drawing/2010/main">
-        <mc:Choice Requires="a14">
+      <mc:AlternateContent xmlns:mc="http://schemas.openxmlformats.org/markup-compatibility/2006">
+        <mc:Choice xmlns:a14="http://schemas.microsoft.com/office/drawing/2010/main" Requires="a14">
           <p:sp>
             <p:nvSpPr>
               <p:cNvPr id="65" name="TextBox 64"/>
@@ -6792,7 +6794,7 @@
             </p:nvSpPr>
             <p:spPr>
               <a:xfrm>
-                <a:off x="1433908" y="3172965"/>
+                <a:off x="1454200" y="3175130"/>
                 <a:ext cx="1578448" cy="300852"/>
               </a:xfrm>
               <a:prstGeom prst="rect">
@@ -6851,7 +6853,7 @@
             </p:txBody>
           </p:sp>
         </mc:Choice>
-        <mc:Fallback xmlns="">
+        <mc:Fallback>
           <p:sp>
             <p:nvSpPr>
               <p:cNvPr id="65" name="TextBox 64"/>
@@ -6862,7 +6864,7 @@
             </p:nvSpPr>
             <p:spPr>
               <a:xfrm>
-                <a:off x="1433908" y="3172965"/>
+                <a:off x="1454200" y="3175130"/>
                 <a:ext cx="1578448" cy="300852"/>
               </a:xfrm>
               <a:prstGeom prst="rect">
@@ -6871,7 +6873,7 @@
               <a:blipFill rotWithShape="0">
                 <a:blip r:embed="rId12"/>
                 <a:stretch>
-                  <a:fillRect b="-10000"/>
+                  <a:fillRect l="-388" b="-12245"/>
                 </a:stretch>
               </a:blipFill>
             </p:spPr>
@@ -6907,9 +6909,10 @@
           <a:ln w="28575"/>
           <a:effectLst>
             <a:glow rad="228600">
-              <a:srgbClr val="7030A0">
+              <a:schemeClr val="accent1">
+                <a:satMod val="175000"/>
                 <a:alpha val="40000"/>
-              </a:srgbClr>
+              </a:schemeClr>
             </a:glow>
           </a:effectLst>
         </p:spPr>
@@ -6941,8 +6944,8 @@
           </a:p>
         </p:txBody>
       </p:sp>
-      <mc:AlternateContent xmlns:mc="http://schemas.openxmlformats.org/markup-compatibility/2006" xmlns:a14="http://schemas.microsoft.com/office/drawing/2010/main">
-        <mc:Choice Requires="a14">
+      <mc:AlternateContent xmlns:mc="http://schemas.openxmlformats.org/markup-compatibility/2006">
+        <mc:Choice xmlns:a14="http://schemas.microsoft.com/office/drawing/2010/main" Requires="a14">
           <p:sp>
             <p:nvSpPr>
               <p:cNvPr id="67" name="TextBox 66"/>
@@ -6951,12 +6954,81 @@
             </p:nvSpPr>
             <p:spPr>
               <a:xfrm>
-                <a:off x="1433907" y="3549875"/>
+                <a:off x="1433905" y="3548223"/>
                 <a:ext cx="1658287" cy="300852"/>
               </a:xfrm>
-              <a:prstGeom prst="rect">
+              <a:custGeom>
                 <a:avLst/>
-              </a:prstGeom>
+                <a:gdLst>
+                  <a:gd name="connsiteX0" fmla="*/ 0 w 1658287"/>
+                  <a:gd name="connsiteY0" fmla="*/ 0 h 300852"/>
+                  <a:gd name="connsiteX1" fmla="*/ 1658287 w 1658287"/>
+                  <a:gd name="connsiteY1" fmla="*/ 0 h 300852"/>
+                  <a:gd name="connsiteX2" fmla="*/ 1658287 w 1658287"/>
+                  <a:gd name="connsiteY2" fmla="*/ 300852 h 300852"/>
+                  <a:gd name="connsiteX3" fmla="*/ 0 w 1658287"/>
+                  <a:gd name="connsiteY3" fmla="*/ 300852 h 300852"/>
+                  <a:gd name="connsiteX4" fmla="*/ 0 w 1658287"/>
+                  <a:gd name="connsiteY4" fmla="*/ 0 h 300852"/>
+                  <a:gd name="connsiteX0" fmla="*/ 0 w 1658287"/>
+                  <a:gd name="connsiteY0" fmla="*/ 0 h 300852"/>
+                  <a:gd name="connsiteX1" fmla="*/ 1658287 w 1658287"/>
+                  <a:gd name="connsiteY1" fmla="*/ 0 h 300852"/>
+                  <a:gd name="connsiteX2" fmla="*/ 1643830 w 1658287"/>
+                  <a:gd name="connsiteY2" fmla="*/ 196935 h 300852"/>
+                  <a:gd name="connsiteX3" fmla="*/ 1658287 w 1658287"/>
+                  <a:gd name="connsiteY3" fmla="*/ 300852 h 300852"/>
+                  <a:gd name="connsiteX4" fmla="*/ 0 w 1658287"/>
+                  <a:gd name="connsiteY4" fmla="*/ 300852 h 300852"/>
+                  <a:gd name="connsiteX5" fmla="*/ 0 w 1658287"/>
+                  <a:gd name="connsiteY5" fmla="*/ 0 h 300852"/>
+                </a:gdLst>
+                <a:ahLst/>
+                <a:cxnLst>
+                  <a:cxn ang="0">
+                    <a:pos x="connsiteX0" y="connsiteY0"/>
+                  </a:cxn>
+                  <a:cxn ang="0">
+                    <a:pos x="connsiteX1" y="connsiteY1"/>
+                  </a:cxn>
+                  <a:cxn ang="0">
+                    <a:pos x="connsiteX2" y="connsiteY2"/>
+                  </a:cxn>
+                  <a:cxn ang="0">
+                    <a:pos x="connsiteX3" y="connsiteY3"/>
+                  </a:cxn>
+                  <a:cxn ang="0">
+                    <a:pos x="connsiteX4" y="connsiteY4"/>
+                  </a:cxn>
+                  <a:cxn ang="0">
+                    <a:pos x="connsiteX5" y="connsiteY5"/>
+                  </a:cxn>
+                </a:cxnLst>
+                <a:rect l="l" t="t" r="r" b="b"/>
+                <a:pathLst>
+                  <a:path w="1658287" h="300852">
+                    <a:moveTo>
+                      <a:pt x="0" y="0"/>
+                    </a:moveTo>
+                    <a:lnTo>
+                      <a:pt x="1658287" y="0"/>
+                    </a:lnTo>
+                    <a:lnTo>
+                      <a:pt x="1643830" y="196935"/>
+                    </a:lnTo>
+                    <a:lnTo>
+                      <a:pt x="1658287" y="300852"/>
+                    </a:lnTo>
+                    <a:lnTo>
+                      <a:pt x="0" y="300852"/>
+                    </a:lnTo>
+                    <a:lnTo>
+                      <a:pt x="0" y="0"/>
+                    </a:lnTo>
+                    <a:close/>
+                  </a:path>
+                </a:pathLst>
+              </a:custGeom>
               <a:noFill/>
             </p:spPr>
             <p:txBody>
@@ -7010,7 +7082,7 @@
             </p:txBody>
           </p:sp>
         </mc:Choice>
-        <mc:Fallback xmlns="">
+        <mc:Fallback>
           <p:sp>
             <p:nvSpPr>
               <p:cNvPr id="67" name="TextBox 66"/>
@@ -7021,16 +7093,85 @@
             </p:nvSpPr>
             <p:spPr>
               <a:xfrm>
-                <a:off x="1433907" y="3549875"/>
+                <a:off x="1433905" y="3548223"/>
                 <a:ext cx="1658287" cy="300852"/>
               </a:xfrm>
-              <a:prstGeom prst="rect">
+              <a:custGeom>
                 <a:avLst/>
-              </a:prstGeom>
+                <a:gdLst>
+                  <a:gd name="connsiteX0" fmla="*/ 0 w 1658287"/>
+                  <a:gd name="connsiteY0" fmla="*/ 0 h 300852"/>
+                  <a:gd name="connsiteX1" fmla="*/ 1658287 w 1658287"/>
+                  <a:gd name="connsiteY1" fmla="*/ 0 h 300852"/>
+                  <a:gd name="connsiteX2" fmla="*/ 1658287 w 1658287"/>
+                  <a:gd name="connsiteY2" fmla="*/ 300852 h 300852"/>
+                  <a:gd name="connsiteX3" fmla="*/ 0 w 1658287"/>
+                  <a:gd name="connsiteY3" fmla="*/ 300852 h 300852"/>
+                  <a:gd name="connsiteX4" fmla="*/ 0 w 1658287"/>
+                  <a:gd name="connsiteY4" fmla="*/ 0 h 300852"/>
+                  <a:gd name="connsiteX0" fmla="*/ 0 w 1658287"/>
+                  <a:gd name="connsiteY0" fmla="*/ 0 h 300852"/>
+                  <a:gd name="connsiteX1" fmla="*/ 1658287 w 1658287"/>
+                  <a:gd name="connsiteY1" fmla="*/ 0 h 300852"/>
+                  <a:gd name="connsiteX2" fmla="*/ 1643830 w 1658287"/>
+                  <a:gd name="connsiteY2" fmla="*/ 196935 h 300852"/>
+                  <a:gd name="connsiteX3" fmla="*/ 1658287 w 1658287"/>
+                  <a:gd name="connsiteY3" fmla="*/ 300852 h 300852"/>
+                  <a:gd name="connsiteX4" fmla="*/ 0 w 1658287"/>
+                  <a:gd name="connsiteY4" fmla="*/ 300852 h 300852"/>
+                  <a:gd name="connsiteX5" fmla="*/ 0 w 1658287"/>
+                  <a:gd name="connsiteY5" fmla="*/ 0 h 300852"/>
+                </a:gdLst>
+                <a:ahLst/>
+                <a:cxnLst>
+                  <a:cxn ang="0">
+                    <a:pos x="connsiteX0" y="connsiteY0"/>
+                  </a:cxn>
+                  <a:cxn ang="0">
+                    <a:pos x="connsiteX1" y="connsiteY1"/>
+                  </a:cxn>
+                  <a:cxn ang="0">
+                    <a:pos x="connsiteX2" y="connsiteY2"/>
+                  </a:cxn>
+                  <a:cxn ang="0">
+                    <a:pos x="connsiteX3" y="connsiteY3"/>
+                  </a:cxn>
+                  <a:cxn ang="0">
+                    <a:pos x="connsiteX4" y="connsiteY4"/>
+                  </a:cxn>
+                  <a:cxn ang="0">
+                    <a:pos x="connsiteX5" y="connsiteY5"/>
+                  </a:cxn>
+                </a:cxnLst>
+                <a:rect l="l" t="t" r="r" b="b"/>
+                <a:pathLst>
+                  <a:path w="1658287" h="300852">
+                    <a:moveTo>
+                      <a:pt x="0" y="0"/>
+                    </a:moveTo>
+                    <a:lnTo>
+                      <a:pt x="1658287" y="0"/>
+                    </a:lnTo>
+                    <a:lnTo>
+                      <a:pt x="1643830" y="196935"/>
+                    </a:lnTo>
+                    <a:lnTo>
+                      <a:pt x="1658287" y="300852"/>
+                    </a:lnTo>
+                    <a:lnTo>
+                      <a:pt x="0" y="300852"/>
+                    </a:lnTo>
+                    <a:lnTo>
+                      <a:pt x="0" y="0"/>
+                    </a:lnTo>
+                    <a:close/>
+                  </a:path>
+                </a:pathLst>
+              </a:custGeom>
               <a:blipFill rotWithShape="0">
                 <a:blip r:embed="rId13"/>
                 <a:stretch>
-                  <a:fillRect b="-10000"/>
+                  <a:fillRect b="-12245"/>
                 </a:stretch>
               </a:blipFill>
             </p:spPr>
@@ -7066,9 +7207,10 @@
           <a:ln w="28575"/>
           <a:effectLst>
             <a:glow rad="228600">
-              <a:srgbClr val="7030A0">
+              <a:schemeClr val="accent1">
+                <a:satMod val="175000"/>
                 <a:alpha val="40000"/>
-              </a:srgbClr>
+              </a:schemeClr>
             </a:glow>
           </a:effectLst>
         </p:spPr>
@@ -7100,8 +7242,8 @@
           </a:p>
         </p:txBody>
       </p:sp>
-      <mc:AlternateContent xmlns:mc="http://schemas.openxmlformats.org/markup-compatibility/2006" xmlns:a14="http://schemas.microsoft.com/office/drawing/2010/main">
-        <mc:Choice Requires="a14">
+      <mc:AlternateContent xmlns:mc="http://schemas.openxmlformats.org/markup-compatibility/2006">
+        <mc:Choice xmlns:a14="http://schemas.microsoft.com/office/drawing/2010/main" Requires="a14">
           <p:sp>
             <p:nvSpPr>
               <p:cNvPr id="71" name="TextBox 70"/>
@@ -7110,7 +7252,7 @@
             </p:nvSpPr>
             <p:spPr>
               <a:xfrm>
-                <a:off x="4934670" y="3824837"/>
+                <a:off x="4934670" y="3823954"/>
                 <a:ext cx="2958696" cy="398892"/>
               </a:xfrm>
               <a:prstGeom prst="rect">
@@ -7247,7 +7389,7 @@
             </p:txBody>
           </p:sp>
         </mc:Choice>
-        <mc:Fallback xmlns="">
+        <mc:Fallback>
           <p:sp>
             <p:nvSpPr>
               <p:cNvPr id="71" name="TextBox 70"/>
@@ -7258,7 +7400,7 @@
             </p:nvSpPr>
             <p:spPr>
               <a:xfrm>
-                <a:off x="4934670" y="3824837"/>
+                <a:off x="4934670" y="3823954"/>
                 <a:ext cx="2958696" cy="398892"/>
               </a:xfrm>
               <a:prstGeom prst="rect">
@@ -9070,7 +9212,7 @@
         </p:nvSpPr>
         <p:spPr>
           <a:xfrm>
-            <a:off x="6534770" y="1549862"/>
+            <a:off x="6735513" y="1549862"/>
             <a:ext cx="1708658" cy="857771"/>
           </a:xfrm>
           <a:prstGeom prst="roundRect">
@@ -9119,8 +9261,8 @@
           </a:p>
         </p:txBody>
       </p:sp>
-      <mc:AlternateContent xmlns:mc="http://schemas.openxmlformats.org/markup-compatibility/2006" xmlns:a14="http://schemas.microsoft.com/office/drawing/2010/main">
-        <mc:Choice Requires="a14">
+      <mc:AlternateContent xmlns:mc="http://schemas.openxmlformats.org/markup-compatibility/2006">
+        <mc:Choice xmlns:a14="http://schemas.microsoft.com/office/drawing/2010/main" Requires="a14">
           <p:sp>
             <p:nvSpPr>
               <p:cNvPr id="89" name="TextBox 88"/>
@@ -9129,7 +9271,7 @@
             </p:nvSpPr>
             <p:spPr>
               <a:xfrm>
-                <a:off x="6534770" y="1549864"/>
+                <a:off x="6735513" y="1549864"/>
                 <a:ext cx="1708658" cy="847924"/>
               </a:xfrm>
               <a:prstGeom prst="rect">
@@ -9210,7 +9352,7 @@
             </p:txBody>
           </p:sp>
         </mc:Choice>
-        <mc:Fallback xmlns="">
+        <mc:Fallback>
           <p:sp>
             <p:nvSpPr>
               <p:cNvPr id="89" name="TextBox 88"/>
@@ -9221,7 +9363,7 @@
             </p:nvSpPr>
             <p:spPr>
               <a:xfrm>
-                <a:off x="6534770" y="1549864"/>
+                <a:off x="6735513" y="1549864"/>
                 <a:ext cx="1708658" cy="847924"/>
               </a:xfrm>
               <a:prstGeom prst="rect">
@@ -10283,19 +10425,19 @@
           <p:cNvPr id="126" name="Curved Connector 125"/>
           <p:cNvCxnSpPr>
             <a:stCxn id="7" idx="2"/>
-            <a:endCxn id="62" idx="1"/>
+            <a:endCxn id="65" idx="3"/>
           </p:cNvCxnSpPr>
           <p:nvPr/>
         </p:nvCxnSpPr>
         <p:spPr>
-          <a:xfrm rot="5400000">
-            <a:off x="955071" y="2420827"/>
-            <a:ext cx="1310592" cy="784432"/>
+          <a:xfrm rot="16200000" flipH="1">
+            <a:off x="1933713" y="2226620"/>
+            <a:ext cx="1167809" cy="1030062"/>
           </a:xfrm>
           <a:prstGeom prst="curvedConnector4">
             <a:avLst>
-              <a:gd name="adj1" fmla="val 26792"/>
-              <a:gd name="adj2" fmla="val 129142"/>
+              <a:gd name="adj1" fmla="val 43559"/>
+              <a:gd name="adj2" fmla="val 122193"/>
             </a:avLst>
           </a:prstGeom>
           <a:ln>
@@ -10321,18 +10463,20 @@
         <p:nvCxnSpPr>
           <p:cNvPr id="128" name="Curved Connector 127"/>
           <p:cNvCxnSpPr>
-            <a:stCxn id="8" idx="2"/>
-            <a:endCxn id="62" idx="0"/>
+            <a:stCxn id="8" idx="1"/>
+            <a:endCxn id="67" idx="1"/>
           </p:cNvCxnSpPr>
           <p:nvPr/>
         </p:nvCxnSpPr>
         <p:spPr>
-          <a:xfrm rot="5400000">
-            <a:off x="3444963" y="904479"/>
-            <a:ext cx="756468" cy="3154609"/>
+          <a:xfrm rot="10800000" flipV="1">
+            <a:off x="3092193" y="1971021"/>
+            <a:ext cx="1523877" cy="1577202"/>
           </a:xfrm>
           <a:prstGeom prst="curvedConnector3">
-            <a:avLst/>
+            <a:avLst>
+              <a:gd name="adj1" fmla="val 50000"/>
+            </a:avLst>
           </a:prstGeom>
           <a:ln>
             <a:tailEnd type="triangle" w="lg" len="lg"/>
@@ -10364,7 +10508,7 @@
         </p:nvCxnSpPr>
         <p:spPr>
           <a:xfrm>
-            <a:off x="7379039" y="585874"/>
+            <a:off x="7579782" y="585874"/>
             <a:ext cx="10060" cy="963990"/>
           </a:xfrm>
           <a:prstGeom prst="straightConnector1">
@@ -10401,7 +10545,7 @@
         <p:spPr>
           <a:xfrm>
             <a:off x="6184940" y="1971021"/>
-            <a:ext cx="349830" cy="2805"/>
+            <a:ext cx="550573" cy="2805"/>
           </a:xfrm>
           <a:prstGeom prst="straightConnector1">
             <a:avLst/>
@@ -10436,8 +10580,8 @@
         </p:nvCxnSpPr>
         <p:spPr>
           <a:xfrm rot="5400000">
-            <a:off x="6803985" y="2105437"/>
-            <a:ext cx="282918" cy="887310"/>
+            <a:off x="6904357" y="2005066"/>
+            <a:ext cx="282918" cy="1088053"/>
           </a:xfrm>
           <a:prstGeom prst="curvedConnector3">
             <a:avLst/>
@@ -10652,19 +10796,18 @@
         <p:nvCxnSpPr>
           <p:cNvPr id="160" name="Curved Connector 159"/>
           <p:cNvCxnSpPr>
-            <a:stCxn id="62" idx="3"/>
             <a:endCxn id="76" idx="1"/>
           </p:cNvCxnSpPr>
           <p:nvPr/>
         </p:nvCxnSpPr>
         <p:spPr>
           <a:xfrm>
-            <a:off x="3273643" y="3468338"/>
-            <a:ext cx="3459287" cy="2649244"/>
+            <a:off x="3393699" y="5021570"/>
+            <a:ext cx="3339228" cy="1096011"/>
           </a:xfrm>
           <a:prstGeom prst="curvedConnector3">
             <a:avLst>
-              <a:gd name="adj1" fmla="val 38810"/>
+              <a:gd name="adj1" fmla="val 64360"/>
             </a:avLst>
           </a:prstGeom>
           <a:ln>
@@ -11263,6 +11406,813 @@
           </a:fontRef>
         </p:style>
       </p:cxnSp>
+      <p:cxnSp>
+        <p:nvCxnSpPr>
+          <p:cNvPr id="101" name="Curved Connector 100"/>
+          <p:cNvCxnSpPr>
+            <a:endCxn id="66" idx="3"/>
+          </p:cNvCxnSpPr>
+          <p:nvPr/>
+        </p:nvCxnSpPr>
+        <p:spPr>
+          <a:xfrm rot="10800000" flipV="1">
+            <a:off x="3092195" y="3168410"/>
+            <a:ext cx="1853239" cy="524926"/>
+          </a:xfrm>
+          <a:prstGeom prst="curvedConnector3">
+            <a:avLst>
+              <a:gd name="adj1" fmla="val 50000"/>
+            </a:avLst>
+          </a:prstGeom>
+          <a:ln>
+            <a:tailEnd type="triangle" w="lg" len="lg"/>
+          </a:ln>
+        </p:spPr>
+        <p:style>
+          <a:lnRef idx="3">
+            <a:schemeClr val="accent3"/>
+          </a:lnRef>
+          <a:fillRef idx="0">
+            <a:schemeClr val="accent3"/>
+          </a:fillRef>
+          <a:effectRef idx="2">
+            <a:schemeClr val="accent3"/>
+          </a:effectRef>
+          <a:fontRef idx="minor">
+            <a:schemeClr val="tx1"/>
+          </a:fontRef>
+        </p:style>
+      </p:cxnSp>
+      <p:cxnSp>
+        <p:nvCxnSpPr>
+          <p:cNvPr id="108" name="Curved Connector 107"/>
+          <p:cNvCxnSpPr>
+            <a:stCxn id="64" idx="1"/>
+            <a:endCxn id="66" idx="1"/>
+          </p:cNvCxnSpPr>
+          <p:nvPr/>
+        </p:nvCxnSpPr>
+        <p:spPr>
+          <a:xfrm rot="10800000" flipV="1">
+            <a:off x="1433908" y="3320430"/>
+            <a:ext cx="1" cy="372905"/>
+          </a:xfrm>
+          <a:prstGeom prst="curvedConnector3">
+            <a:avLst>
+              <a:gd name="adj1" fmla="val 22860100000"/>
+            </a:avLst>
+          </a:prstGeom>
+          <a:ln>
+            <a:tailEnd type="triangle" w="lg" len="lg"/>
+          </a:ln>
+        </p:spPr>
+        <p:style>
+          <a:lnRef idx="3">
+            <a:schemeClr val="accent3"/>
+          </a:lnRef>
+          <a:fillRef idx="0">
+            <a:schemeClr val="accent3"/>
+          </a:fillRef>
+          <a:effectRef idx="2">
+            <a:schemeClr val="accent3"/>
+          </a:effectRef>
+          <a:fontRef idx="minor">
+            <a:schemeClr val="tx1"/>
+          </a:fontRef>
+        </p:style>
+      </p:cxnSp>
+      <p:sp>
+        <p:nvSpPr>
+          <p:cNvPr id="109" name="Flowchart: Alternate Process 108"/>
+          <p:cNvSpPr/>
+          <p:nvPr/>
+        </p:nvSpPr>
+        <p:spPr>
+          <a:xfrm>
+            <a:off x="100361" y="131991"/>
+            <a:ext cx="6377955" cy="2279169"/>
+          </a:xfrm>
+          <a:prstGeom prst="flowChartAlternateProcess">
+            <a:avLst/>
+          </a:prstGeom>
+          <a:noFill/>
+        </p:spPr>
+        <p:style>
+          <a:lnRef idx="2">
+            <a:schemeClr val="accent2"/>
+          </a:lnRef>
+          <a:fillRef idx="1">
+            <a:schemeClr val="lt1"/>
+          </a:fillRef>
+          <a:effectRef idx="0">
+            <a:schemeClr val="accent2"/>
+          </a:effectRef>
+          <a:fontRef idx="minor">
+            <a:schemeClr val="dk1"/>
+          </a:fontRef>
+        </p:style>
+        <p:txBody>
+          <a:bodyPr rtlCol="0" anchor="ctr"/>
+          <a:lstStyle/>
+          <a:p>
+            <a:pPr algn="ctr"/>
+            <a:endParaRPr lang="en-AU"/>
+          </a:p>
+        </p:txBody>
+      </p:sp>
+      <p:sp>
+        <p:nvSpPr>
+          <p:cNvPr id="114" name="Flowchart: Alternate Process 113"/>
+          <p:cNvSpPr/>
+          <p:nvPr/>
+        </p:nvSpPr>
+        <p:spPr>
+          <a:xfrm>
+            <a:off x="780585" y="5323735"/>
+            <a:ext cx="7583632" cy="1340864"/>
+          </a:xfrm>
+          <a:custGeom>
+            <a:avLst/>
+            <a:gdLst>
+              <a:gd name="connsiteX0" fmla="*/ 0 w 7583632"/>
+              <a:gd name="connsiteY0" fmla="*/ 223477 h 1340864"/>
+              <a:gd name="connsiteX1" fmla="*/ 223477 w 7583632"/>
+              <a:gd name="connsiteY1" fmla="*/ 0 h 1340864"/>
+              <a:gd name="connsiteX2" fmla="*/ 7360155 w 7583632"/>
+              <a:gd name="connsiteY2" fmla="*/ 0 h 1340864"/>
+              <a:gd name="connsiteX3" fmla="*/ 7583632 w 7583632"/>
+              <a:gd name="connsiteY3" fmla="*/ 223477 h 1340864"/>
+              <a:gd name="connsiteX4" fmla="*/ 7583632 w 7583632"/>
+              <a:gd name="connsiteY4" fmla="*/ 1117387 h 1340864"/>
+              <a:gd name="connsiteX5" fmla="*/ 7360155 w 7583632"/>
+              <a:gd name="connsiteY5" fmla="*/ 1340864 h 1340864"/>
+              <a:gd name="connsiteX6" fmla="*/ 223477 w 7583632"/>
+              <a:gd name="connsiteY6" fmla="*/ 1340864 h 1340864"/>
+              <a:gd name="connsiteX7" fmla="*/ 0 w 7583632"/>
+              <a:gd name="connsiteY7" fmla="*/ 1117387 h 1340864"/>
+              <a:gd name="connsiteX8" fmla="*/ 0 w 7583632"/>
+              <a:gd name="connsiteY8" fmla="*/ 223477 h 1340864"/>
+              <a:gd name="connsiteX0" fmla="*/ 0 w 7583632"/>
+              <a:gd name="connsiteY0" fmla="*/ 223477 h 1340864"/>
+              <a:gd name="connsiteX1" fmla="*/ 223477 w 7583632"/>
+              <a:gd name="connsiteY1" fmla="*/ 0 h 1340864"/>
+              <a:gd name="connsiteX2" fmla="*/ 7326702 w 7583632"/>
+              <a:gd name="connsiteY2" fmla="*/ 289932 h 1340864"/>
+              <a:gd name="connsiteX3" fmla="*/ 7583632 w 7583632"/>
+              <a:gd name="connsiteY3" fmla="*/ 223477 h 1340864"/>
+              <a:gd name="connsiteX4" fmla="*/ 7583632 w 7583632"/>
+              <a:gd name="connsiteY4" fmla="*/ 1117387 h 1340864"/>
+              <a:gd name="connsiteX5" fmla="*/ 7360155 w 7583632"/>
+              <a:gd name="connsiteY5" fmla="*/ 1340864 h 1340864"/>
+              <a:gd name="connsiteX6" fmla="*/ 223477 w 7583632"/>
+              <a:gd name="connsiteY6" fmla="*/ 1340864 h 1340864"/>
+              <a:gd name="connsiteX7" fmla="*/ 0 w 7583632"/>
+              <a:gd name="connsiteY7" fmla="*/ 1117387 h 1340864"/>
+              <a:gd name="connsiteX8" fmla="*/ 0 w 7583632"/>
+              <a:gd name="connsiteY8" fmla="*/ 223477 h 1340864"/>
+              <a:gd name="connsiteX0" fmla="*/ 0 w 7583632"/>
+              <a:gd name="connsiteY0" fmla="*/ 223477 h 1340864"/>
+              <a:gd name="connsiteX1" fmla="*/ 223477 w 7583632"/>
+              <a:gd name="connsiteY1" fmla="*/ 0 h 1340864"/>
+              <a:gd name="connsiteX2" fmla="*/ 7326702 w 7583632"/>
+              <a:gd name="connsiteY2" fmla="*/ 289932 h 1340864"/>
+              <a:gd name="connsiteX3" fmla="*/ 7583632 w 7583632"/>
+              <a:gd name="connsiteY3" fmla="*/ 558013 h 1340864"/>
+              <a:gd name="connsiteX4" fmla="*/ 7583632 w 7583632"/>
+              <a:gd name="connsiteY4" fmla="*/ 1117387 h 1340864"/>
+              <a:gd name="connsiteX5" fmla="*/ 7360155 w 7583632"/>
+              <a:gd name="connsiteY5" fmla="*/ 1340864 h 1340864"/>
+              <a:gd name="connsiteX6" fmla="*/ 223477 w 7583632"/>
+              <a:gd name="connsiteY6" fmla="*/ 1340864 h 1340864"/>
+              <a:gd name="connsiteX7" fmla="*/ 0 w 7583632"/>
+              <a:gd name="connsiteY7" fmla="*/ 1117387 h 1340864"/>
+              <a:gd name="connsiteX8" fmla="*/ 0 w 7583632"/>
+              <a:gd name="connsiteY8" fmla="*/ 223477 h 1340864"/>
+            </a:gdLst>
+            <a:ahLst/>
+            <a:cxnLst>
+              <a:cxn ang="0">
+                <a:pos x="connsiteX0" y="connsiteY0"/>
+              </a:cxn>
+              <a:cxn ang="0">
+                <a:pos x="connsiteX1" y="connsiteY1"/>
+              </a:cxn>
+              <a:cxn ang="0">
+                <a:pos x="connsiteX2" y="connsiteY2"/>
+              </a:cxn>
+              <a:cxn ang="0">
+                <a:pos x="connsiteX3" y="connsiteY3"/>
+              </a:cxn>
+              <a:cxn ang="0">
+                <a:pos x="connsiteX4" y="connsiteY4"/>
+              </a:cxn>
+              <a:cxn ang="0">
+                <a:pos x="connsiteX5" y="connsiteY5"/>
+              </a:cxn>
+              <a:cxn ang="0">
+                <a:pos x="connsiteX6" y="connsiteY6"/>
+              </a:cxn>
+              <a:cxn ang="0">
+                <a:pos x="connsiteX7" y="connsiteY7"/>
+              </a:cxn>
+              <a:cxn ang="0">
+                <a:pos x="connsiteX8" y="connsiteY8"/>
+              </a:cxn>
+            </a:cxnLst>
+            <a:rect l="l" t="t" r="r" b="b"/>
+            <a:pathLst>
+              <a:path w="7583632" h="1340864">
+                <a:moveTo>
+                  <a:pt x="0" y="223477"/>
+                </a:moveTo>
+                <a:cubicBezTo>
+                  <a:pt x="0" y="100054"/>
+                  <a:pt x="100054" y="0"/>
+                  <a:pt x="223477" y="0"/>
+                </a:cubicBezTo>
+                <a:cubicBezTo>
+                  <a:pt x="2602370" y="0"/>
+                  <a:pt x="4947809" y="289932"/>
+                  <a:pt x="7326702" y="289932"/>
+                </a:cubicBezTo>
+                <a:cubicBezTo>
+                  <a:pt x="7450125" y="289932"/>
+                  <a:pt x="7583632" y="434590"/>
+                  <a:pt x="7583632" y="558013"/>
+                </a:cubicBezTo>
+                <a:lnTo>
+                  <a:pt x="7583632" y="1117387"/>
+                </a:lnTo>
+                <a:cubicBezTo>
+                  <a:pt x="7583632" y="1240810"/>
+                  <a:pt x="7483578" y="1340864"/>
+                  <a:pt x="7360155" y="1340864"/>
+                </a:cubicBezTo>
+                <a:lnTo>
+                  <a:pt x="223477" y="1340864"/>
+                </a:lnTo>
+                <a:cubicBezTo>
+                  <a:pt x="100054" y="1340864"/>
+                  <a:pt x="0" y="1240810"/>
+                  <a:pt x="0" y="1117387"/>
+                </a:cubicBezTo>
+                <a:lnTo>
+                  <a:pt x="0" y="223477"/>
+                </a:lnTo>
+                <a:close/>
+              </a:path>
+            </a:pathLst>
+          </a:custGeom>
+          <a:noFill/>
+          <a:ln>
+            <a:solidFill>
+              <a:srgbClr val="9966FF"/>
+            </a:solidFill>
+          </a:ln>
+        </p:spPr>
+        <p:style>
+          <a:lnRef idx="2">
+            <a:schemeClr val="dk1"/>
+          </a:lnRef>
+          <a:fillRef idx="1">
+            <a:schemeClr val="lt1"/>
+          </a:fillRef>
+          <a:effectRef idx="0">
+            <a:schemeClr val="dk1"/>
+          </a:effectRef>
+          <a:fontRef idx="minor">
+            <a:schemeClr val="dk1"/>
+          </a:fontRef>
+        </p:style>
+        <p:txBody>
+          <a:bodyPr rtlCol="0" anchor="ctr"/>
+          <a:lstStyle/>
+          <a:p>
+            <a:pPr algn="ctr"/>
+            <a:endParaRPr lang="en-AU" dirty="0"/>
+          </a:p>
+        </p:txBody>
+      </p:sp>
+      <p:sp>
+        <p:nvSpPr>
+          <p:cNvPr id="116" name="TextBox 115"/>
+          <p:cNvSpPr txBox="1"/>
+          <p:nvPr/>
+        </p:nvSpPr>
+        <p:spPr>
+          <a:xfrm>
+            <a:off x="72910" y="286659"/>
+            <a:ext cx="1226953" cy="646331"/>
+          </a:xfrm>
+          <a:prstGeom prst="rect">
+            <a:avLst/>
+          </a:prstGeom>
+          <a:noFill/>
+        </p:spPr>
+        <p:txBody>
+          <a:bodyPr wrap="square" rtlCol="0">
+            <a:spAutoFit/>
+          </a:bodyPr>
+          <a:lstStyle/>
+          <a:p>
+            <a:r>
+              <a:rPr lang="en-AU" i="1" dirty="0" smtClean="0">
+                <a:solidFill>
+                  <a:srgbClr val="F1650F"/>
+                </a:solidFill>
+                <a:latin typeface="Helvetica" panose="020B0604020202020204" pitchFamily="34" charset="0"/>
+                <a:cs typeface="Helvetica" panose="020B0604020202020204" pitchFamily="34" charset="0"/>
+              </a:rPr>
+              <a:t>Feature Extraction</a:t>
+            </a:r>
+            <a:endParaRPr lang="en-AU" i="1" dirty="0">
+              <a:solidFill>
+                <a:srgbClr val="F1650F"/>
+              </a:solidFill>
+              <a:latin typeface="Helvetica" panose="020B0604020202020204" pitchFamily="34" charset="0"/>
+              <a:cs typeface="Helvetica" panose="020B0604020202020204" pitchFamily="34" charset="0"/>
+            </a:endParaRPr>
+          </a:p>
+        </p:txBody>
+      </p:sp>
+      <p:sp>
+        <p:nvSpPr>
+          <p:cNvPr id="145" name="TextBox 144"/>
+          <p:cNvSpPr txBox="1"/>
+          <p:nvPr/>
+        </p:nvSpPr>
+        <p:spPr>
+          <a:xfrm>
+            <a:off x="835409" y="6026324"/>
+            <a:ext cx="1337134" cy="646331"/>
+          </a:xfrm>
+          <a:prstGeom prst="rect">
+            <a:avLst/>
+          </a:prstGeom>
+          <a:noFill/>
+        </p:spPr>
+        <p:txBody>
+          <a:bodyPr wrap="square" rtlCol="0">
+            <a:spAutoFit/>
+          </a:bodyPr>
+          <a:lstStyle/>
+          <a:p>
+            <a:r>
+              <a:rPr lang="en-AU" i="1" dirty="0" smtClean="0">
+                <a:solidFill>
+                  <a:srgbClr val="9966FF"/>
+                </a:solidFill>
+                <a:latin typeface="Helvetica" panose="020B0604020202020204" pitchFamily="34" charset="0"/>
+                <a:cs typeface="Helvetica" panose="020B0604020202020204" pitchFamily="34" charset="0"/>
+              </a:rPr>
+              <a:t>Latent Distribution</a:t>
+            </a:r>
+            <a:endParaRPr lang="en-AU" i="1" dirty="0">
+              <a:solidFill>
+                <a:srgbClr val="9966FF"/>
+              </a:solidFill>
+              <a:latin typeface="Helvetica" panose="020B0604020202020204" pitchFamily="34" charset="0"/>
+              <a:cs typeface="Helvetica" panose="020B0604020202020204" pitchFamily="34" charset="0"/>
+            </a:endParaRPr>
+          </a:p>
+        </p:txBody>
+      </p:sp>
+      <p:sp>
+        <p:nvSpPr>
+          <p:cNvPr id="147" name="TextBox 146"/>
+          <p:cNvSpPr txBox="1"/>
+          <p:nvPr/>
+        </p:nvSpPr>
+        <p:spPr>
+          <a:xfrm>
+            <a:off x="7638017" y="718570"/>
+            <a:ext cx="1343709" cy="646331"/>
+          </a:xfrm>
+          <a:prstGeom prst="rect">
+            <a:avLst/>
+          </a:prstGeom>
+          <a:noFill/>
+        </p:spPr>
+        <p:txBody>
+          <a:bodyPr wrap="square" rtlCol="0">
+            <a:spAutoFit/>
+          </a:bodyPr>
+          <a:lstStyle/>
+          <a:p>
+            <a:r>
+              <a:rPr lang="en-AU" i="1" dirty="0" smtClean="0">
+                <a:solidFill>
+                  <a:srgbClr val="00B0F0"/>
+                </a:solidFill>
+                <a:latin typeface="Helvetica" panose="020B0604020202020204" pitchFamily="34" charset="0"/>
+                <a:cs typeface="Helvetica" panose="020B0604020202020204" pitchFamily="34" charset="0"/>
+              </a:rPr>
+              <a:t>Learning &amp; Training</a:t>
+            </a:r>
+            <a:endParaRPr lang="en-AU" i="1" dirty="0">
+              <a:solidFill>
+                <a:srgbClr val="00B0F0"/>
+              </a:solidFill>
+              <a:latin typeface="Helvetica" panose="020B0604020202020204" pitchFamily="34" charset="0"/>
+              <a:cs typeface="Helvetica" panose="020B0604020202020204" pitchFamily="34" charset="0"/>
+            </a:endParaRPr>
+          </a:p>
+        </p:txBody>
+      </p:sp>
+      <p:sp>
+        <p:nvSpPr>
+          <p:cNvPr id="150" name="Flowchart: Alternate Process 149"/>
+          <p:cNvSpPr/>
+          <p:nvPr/>
+        </p:nvSpPr>
+        <p:spPr>
+          <a:xfrm>
+            <a:off x="780584" y="6747130"/>
+            <a:ext cx="8187337" cy="2497231"/>
+          </a:xfrm>
+          <a:prstGeom prst="flowChartAlternateProcess">
+            <a:avLst/>
+          </a:prstGeom>
+          <a:noFill/>
+          <a:ln>
+            <a:solidFill>
+              <a:srgbClr val="00B050"/>
+            </a:solidFill>
+          </a:ln>
+        </p:spPr>
+        <p:style>
+          <a:lnRef idx="2">
+            <a:schemeClr val="accent2"/>
+          </a:lnRef>
+          <a:fillRef idx="1">
+            <a:schemeClr val="lt1"/>
+          </a:fillRef>
+          <a:effectRef idx="0">
+            <a:schemeClr val="accent2"/>
+          </a:effectRef>
+          <a:fontRef idx="minor">
+            <a:schemeClr val="dk1"/>
+          </a:fontRef>
+        </p:style>
+        <p:txBody>
+          <a:bodyPr rtlCol="0" anchor="ctr"/>
+          <a:lstStyle/>
+          <a:p>
+            <a:pPr algn="ctr"/>
+            <a:endParaRPr lang="en-AU"/>
+          </a:p>
+        </p:txBody>
+      </p:sp>
+      <p:sp>
+        <p:nvSpPr>
+          <p:cNvPr id="151" name="TextBox 150"/>
+          <p:cNvSpPr txBox="1"/>
+          <p:nvPr/>
+        </p:nvSpPr>
+        <p:spPr>
+          <a:xfrm>
+            <a:off x="7430294" y="7763384"/>
+            <a:ext cx="1362739" cy="646331"/>
+          </a:xfrm>
+          <a:prstGeom prst="rect">
+            <a:avLst/>
+          </a:prstGeom>
+          <a:noFill/>
+        </p:spPr>
+        <p:txBody>
+          <a:bodyPr wrap="square" rtlCol="0">
+            <a:spAutoFit/>
+          </a:bodyPr>
+          <a:lstStyle/>
+          <a:p>
+            <a:r>
+              <a:rPr lang="en-AU" i="1" dirty="0" smtClean="0">
+                <a:solidFill>
+                  <a:srgbClr val="00B050"/>
+                </a:solidFill>
+                <a:latin typeface="Helvetica" panose="020B0604020202020204" pitchFamily="34" charset="0"/>
+                <a:cs typeface="Helvetica" panose="020B0604020202020204" pitchFamily="34" charset="0"/>
+              </a:rPr>
+              <a:t>Inference &amp; Prediction</a:t>
+            </a:r>
+            <a:endParaRPr lang="en-AU" i="1" dirty="0">
+              <a:solidFill>
+                <a:srgbClr val="00B050"/>
+              </a:solidFill>
+              <a:latin typeface="Helvetica" panose="020B0604020202020204" pitchFamily="34" charset="0"/>
+              <a:cs typeface="Helvetica" panose="020B0604020202020204" pitchFamily="34" charset="0"/>
+            </a:endParaRPr>
+          </a:p>
+        </p:txBody>
+      </p:sp>
+      <p:sp>
+        <p:nvSpPr>
+          <p:cNvPr id="153" name="Rounded Rectangle 152"/>
+          <p:cNvSpPr/>
+          <p:nvPr/>
+        </p:nvSpPr>
+        <p:spPr>
+          <a:xfrm>
+            <a:off x="381202" y="2619118"/>
+            <a:ext cx="293588" cy="264223"/>
+          </a:xfrm>
+          <a:prstGeom prst="roundRect">
+            <a:avLst/>
+          </a:prstGeom>
+          <a:ln w="28575"/>
+          <a:effectLst>
+            <a:glow rad="228600">
+              <a:schemeClr val="accent1">
+                <a:satMod val="175000"/>
+                <a:alpha val="40000"/>
+              </a:schemeClr>
+            </a:glow>
+            <a:softEdge rad="0"/>
+          </a:effectLst>
+        </p:spPr>
+        <p:style>
+          <a:lnRef idx="2">
+            <a:schemeClr val="accent5"/>
+          </a:lnRef>
+          <a:fillRef idx="1">
+            <a:schemeClr val="lt1"/>
+          </a:fillRef>
+          <a:effectRef idx="0">
+            <a:schemeClr val="accent5"/>
+          </a:effectRef>
+          <a:fontRef idx="minor">
+            <a:schemeClr val="dk1"/>
+          </a:fontRef>
+        </p:style>
+        <p:txBody>
+          <a:bodyPr rot="0" spcFirstLastPara="0" vertOverflow="overflow" horzOverflow="overflow" vert="horz" wrap="square" lIns="77421" tIns="38710" rIns="77421" bIns="38710" numCol="1" spcCol="0" rtlCol="0" fromWordArt="0" anchor="ctr" anchorCtr="0" forceAA="0" compatLnSpc="1">
+            <a:prstTxWarp prst="textNoShape">
+              <a:avLst/>
+            </a:prstTxWarp>
+            <a:noAutofit/>
+          </a:bodyPr>
+          <a:lstStyle/>
+          <a:p>
+            <a:pPr algn="ctr"/>
+            <a:endParaRPr lang="en-AU" sz="1185"/>
+          </a:p>
+        </p:txBody>
+      </p:sp>
+      <p:sp>
+        <p:nvSpPr>
+          <p:cNvPr id="157" name="Rounded Rectangle 156"/>
+          <p:cNvSpPr/>
+          <p:nvPr/>
+        </p:nvSpPr>
+        <p:spPr>
+          <a:xfrm>
+            <a:off x="390161" y="4340941"/>
+            <a:ext cx="283045" cy="265562"/>
+          </a:xfrm>
+          <a:prstGeom prst="roundRect">
+            <a:avLst/>
+          </a:prstGeom>
+          <a:ln w="28575">
+            <a:solidFill>
+              <a:srgbClr val="00B050"/>
+            </a:solidFill>
+            <a:prstDash val="sysDot"/>
+          </a:ln>
+          <a:effectLst>
+            <a:glow rad="228600">
+              <a:schemeClr val="accent6">
+                <a:satMod val="175000"/>
+                <a:alpha val="40000"/>
+              </a:schemeClr>
+            </a:glow>
+          </a:effectLst>
+        </p:spPr>
+        <p:style>
+          <a:lnRef idx="2">
+            <a:schemeClr val="accent5"/>
+          </a:lnRef>
+          <a:fillRef idx="1">
+            <a:schemeClr val="lt1"/>
+          </a:fillRef>
+          <a:effectRef idx="0">
+            <a:schemeClr val="accent5"/>
+          </a:effectRef>
+          <a:fontRef idx="minor">
+            <a:schemeClr val="dk1"/>
+          </a:fontRef>
+        </p:style>
+        <p:txBody>
+          <a:bodyPr rot="0" spcFirstLastPara="0" vertOverflow="overflow" horzOverflow="overflow" vert="horz" wrap="square" lIns="77421" tIns="38710" rIns="77421" bIns="38710" numCol="1" spcCol="0" rtlCol="0" fromWordArt="0" anchor="ctr" anchorCtr="0" forceAA="0" compatLnSpc="1">
+            <a:prstTxWarp prst="textNoShape">
+              <a:avLst/>
+            </a:prstTxWarp>
+            <a:noAutofit/>
+          </a:bodyPr>
+          <a:lstStyle/>
+          <a:p>
+            <a:pPr algn="ctr"/>
+            <a:endParaRPr lang="en-AU" sz="1185"/>
+          </a:p>
+        </p:txBody>
+      </p:sp>
+      <p:sp>
+        <p:nvSpPr>
+          <p:cNvPr id="165" name="Rounded Rectangle 164"/>
+          <p:cNvSpPr/>
+          <p:nvPr/>
+        </p:nvSpPr>
+        <p:spPr>
+          <a:xfrm>
+            <a:off x="390293" y="3446603"/>
+            <a:ext cx="284497" cy="277628"/>
+          </a:xfrm>
+          <a:prstGeom prst="roundRect">
+            <a:avLst/>
+          </a:prstGeom>
+          <a:ln w="28575"/>
+          <a:effectLst>
+            <a:glow rad="228600">
+              <a:srgbClr val="7030A0">
+                <a:alpha val="40000"/>
+              </a:srgbClr>
+            </a:glow>
+          </a:effectLst>
+        </p:spPr>
+        <p:style>
+          <a:lnRef idx="2">
+            <a:schemeClr val="accent5"/>
+          </a:lnRef>
+          <a:fillRef idx="1">
+            <a:schemeClr val="lt1"/>
+          </a:fillRef>
+          <a:effectRef idx="0">
+            <a:schemeClr val="accent5"/>
+          </a:effectRef>
+          <a:fontRef idx="minor">
+            <a:schemeClr val="dk1"/>
+          </a:fontRef>
+        </p:style>
+        <p:txBody>
+          <a:bodyPr rot="0" spcFirstLastPara="0" vertOverflow="overflow" horzOverflow="overflow" vert="horz" wrap="square" lIns="77421" tIns="38710" rIns="77421" bIns="38710" numCol="1" spcCol="0" rtlCol="0" fromWordArt="0" anchor="ctr" anchorCtr="0" forceAA="0" compatLnSpc="1">
+            <a:prstTxWarp prst="textNoShape">
+              <a:avLst/>
+            </a:prstTxWarp>
+            <a:noAutofit/>
+          </a:bodyPr>
+          <a:lstStyle/>
+          <a:p>
+            <a:pPr algn="ctr"/>
+            <a:endParaRPr lang="en-AU" sz="1185"/>
+          </a:p>
+        </p:txBody>
+      </p:sp>
+      <p:sp>
+        <p:nvSpPr>
+          <p:cNvPr id="167" name="TextBox 166"/>
+          <p:cNvSpPr txBox="1"/>
+          <p:nvPr/>
+        </p:nvSpPr>
+        <p:spPr>
+          <a:xfrm>
+            <a:off x="0" y="3024034"/>
+            <a:ext cx="1062018" cy="307777"/>
+          </a:xfrm>
+          <a:prstGeom prst="rect">
+            <a:avLst/>
+          </a:prstGeom>
+          <a:noFill/>
+        </p:spPr>
+        <p:txBody>
+          <a:bodyPr wrap="square" rtlCol="0">
+            <a:spAutoFit/>
+          </a:bodyPr>
+          <a:lstStyle/>
+          <a:p>
+            <a:pPr algn="ctr"/>
+            <a:r>
+              <a:rPr lang="en-AU" sz="1400" i="1" dirty="0" smtClean="0">
+                <a:solidFill>
+                  <a:schemeClr val="tx1">
+                    <a:lumMod val="50000"/>
+                    <a:lumOff val="50000"/>
+                  </a:schemeClr>
+                </a:solidFill>
+                <a:latin typeface="Helvetica" panose="020B0604020202020204" pitchFamily="34" charset="0"/>
+                <a:cs typeface="Helvetica" panose="020B0604020202020204" pitchFamily="34" charset="0"/>
+              </a:rPr>
+              <a:t>Quantities</a:t>
+            </a:r>
+            <a:endParaRPr lang="en-AU" sz="1400" i="1" dirty="0">
+              <a:solidFill>
+                <a:schemeClr val="tx1">
+                  <a:lumMod val="50000"/>
+                  <a:lumOff val="50000"/>
+                </a:schemeClr>
+              </a:solidFill>
+              <a:latin typeface="Helvetica" panose="020B0604020202020204" pitchFamily="34" charset="0"/>
+              <a:cs typeface="Helvetica" panose="020B0604020202020204" pitchFamily="34" charset="0"/>
+            </a:endParaRPr>
+          </a:p>
+        </p:txBody>
+      </p:sp>
+      <p:sp>
+        <p:nvSpPr>
+          <p:cNvPr id="169" name="TextBox 168"/>
+          <p:cNvSpPr txBox="1"/>
+          <p:nvPr/>
+        </p:nvSpPr>
+        <p:spPr>
+          <a:xfrm>
+            <a:off x="154071" y="3882437"/>
+            <a:ext cx="770809" cy="305029"/>
+          </a:xfrm>
+          <a:prstGeom prst="rect">
+            <a:avLst/>
+          </a:prstGeom>
+          <a:noFill/>
+        </p:spPr>
+        <p:txBody>
+          <a:bodyPr wrap="square" rtlCol="0">
+            <a:spAutoFit/>
+          </a:bodyPr>
+          <a:lstStyle/>
+          <a:p>
+            <a:pPr algn="ctr"/>
+            <a:r>
+              <a:rPr lang="en-AU" sz="1400" i="1" dirty="0" smtClean="0">
+                <a:solidFill>
+                  <a:schemeClr val="tx1">
+                    <a:lumMod val="50000"/>
+                    <a:lumOff val="50000"/>
+                  </a:schemeClr>
+                </a:solidFill>
+                <a:latin typeface="Helvetica" panose="020B0604020202020204" pitchFamily="34" charset="0"/>
+                <a:cs typeface="Helvetica" panose="020B0604020202020204" pitchFamily="34" charset="0"/>
+              </a:rPr>
+              <a:t>Cache</a:t>
+            </a:r>
+            <a:endParaRPr lang="en-AU" sz="1400" i="1" dirty="0">
+              <a:solidFill>
+                <a:schemeClr val="tx1">
+                  <a:lumMod val="50000"/>
+                  <a:lumOff val="50000"/>
+                </a:schemeClr>
+              </a:solidFill>
+              <a:latin typeface="Helvetica" panose="020B0604020202020204" pitchFamily="34" charset="0"/>
+              <a:cs typeface="Helvetica" panose="020B0604020202020204" pitchFamily="34" charset="0"/>
+            </a:endParaRPr>
+          </a:p>
+        </p:txBody>
+      </p:sp>
+      <p:sp>
+        <p:nvSpPr>
+          <p:cNvPr id="171" name="TextBox 170"/>
+          <p:cNvSpPr txBox="1"/>
+          <p:nvPr/>
+        </p:nvSpPr>
+        <p:spPr>
+          <a:xfrm>
+            <a:off x="114436" y="4746747"/>
+            <a:ext cx="852699" cy="305029"/>
+          </a:xfrm>
+          <a:prstGeom prst="rect">
+            <a:avLst/>
+          </a:prstGeom>
+          <a:noFill/>
+        </p:spPr>
+        <p:txBody>
+          <a:bodyPr wrap="square" rtlCol="0">
+            <a:spAutoFit/>
+          </a:bodyPr>
+          <a:lstStyle/>
+          <a:p>
+            <a:pPr algn="ctr"/>
+            <a:r>
+              <a:rPr lang="en-AU" sz="1400" i="1" dirty="0" smtClean="0">
+                <a:solidFill>
+                  <a:schemeClr val="tx1">
+                    <a:lumMod val="50000"/>
+                    <a:lumOff val="50000"/>
+                  </a:schemeClr>
+                </a:solidFill>
+                <a:latin typeface="Helvetica" panose="020B0604020202020204" pitchFamily="34" charset="0"/>
+                <a:cs typeface="Helvetica" panose="020B0604020202020204" pitchFamily="34" charset="0"/>
+              </a:rPr>
+              <a:t>Process</a:t>
+            </a:r>
+            <a:endParaRPr lang="en-AU" sz="1400" i="1" dirty="0">
+              <a:solidFill>
+                <a:schemeClr val="tx1">
+                  <a:lumMod val="50000"/>
+                  <a:lumOff val="50000"/>
+                </a:schemeClr>
+              </a:solidFill>
+              <a:latin typeface="Helvetica" panose="020B0604020202020204" pitchFamily="34" charset="0"/>
+              <a:cs typeface="Helvetica" panose="020B0604020202020204" pitchFamily="34" charset="0"/>
+            </a:endParaRPr>
+          </a:p>
+        </p:txBody>
+      </p:sp>
     </p:spTree>
     <p:extLst>
       <p:ext uri="{BB962C8B-B14F-4D97-AF65-F5344CB8AC3E}">

</xml_diff>